<commit_message>
Artificial intelligence is added.
</commit_message>
<xml_diff>
--- a/presentations/AI/ArtificialIntelligence.pptx
+++ b/presentations/AI/ArtificialIntelligence.pptx
@@ -5,14 +5,29 @@
     <p:sldMasterId id="2147483648" r:id="rId1"/>
   </p:sldMasterIdLst>
   <p:notesMasterIdLst>
-    <p:notesMasterId r:id="rId7"/>
+    <p:notesMasterId r:id="rId22"/>
   </p:notesMasterIdLst>
   <p:sldIdLst>
     <p:sldId id="256" r:id="rId2"/>
     <p:sldId id="268" r:id="rId3"/>
     <p:sldId id="427" r:id="rId4"/>
     <p:sldId id="428" r:id="rId5"/>
-    <p:sldId id="269" r:id="rId6"/>
+    <p:sldId id="429" r:id="rId6"/>
+    <p:sldId id="430" r:id="rId7"/>
+    <p:sldId id="431" r:id="rId8"/>
+    <p:sldId id="432" r:id="rId9"/>
+    <p:sldId id="433" r:id="rId10"/>
+    <p:sldId id="434" r:id="rId11"/>
+    <p:sldId id="435" r:id="rId12"/>
+    <p:sldId id="438" r:id="rId13"/>
+    <p:sldId id="436" r:id="rId14"/>
+    <p:sldId id="437" r:id="rId15"/>
+    <p:sldId id="440" r:id="rId16"/>
+    <p:sldId id="439" r:id="rId17"/>
+    <p:sldId id="441" r:id="rId18"/>
+    <p:sldId id="442" r:id="rId19"/>
+    <p:sldId id="443" r:id="rId20"/>
+    <p:sldId id="269" r:id="rId21"/>
   </p:sldIdLst>
   <p:sldSz cx="9144000" cy="6858000" type="screen4x3"/>
   <p:notesSz cx="6858000" cy="9144000"/>
@@ -3493,6 +3508,1454 @@
 </p:sld>
 </file>
 
+<file path=ppt/slides/slide10.xml><?xml version="1.0" encoding="utf-8"?>
+<p:sld xmlns:a="http://schemas.openxmlformats.org/drawingml/2006/main" xmlns:r="http://schemas.openxmlformats.org/officeDocument/2006/relationships" xmlns:p="http://schemas.openxmlformats.org/presentationml/2006/main">
+  <p:cSld>
+    <p:spTree>
+      <p:nvGrpSpPr>
+        <p:cNvPr id="1" name=""/>
+        <p:cNvGrpSpPr/>
+        <p:nvPr/>
+      </p:nvGrpSpPr>
+      <p:grpSpPr>
+        <a:xfrm>
+          <a:off x="0" y="0"/>
+          <a:ext cx="0" cy="0"/>
+          <a:chOff x="0" y="0"/>
+          <a:chExt cx="0" cy="0"/>
+        </a:xfrm>
+      </p:grpSpPr>
+      <p:sp>
+        <p:nvSpPr>
+          <p:cNvPr id="2" name="Title 1"/>
+          <p:cNvSpPr>
+            <a:spLocks noGrp="1"/>
+          </p:cNvSpPr>
+          <p:nvPr>
+            <p:ph type="title"/>
+          </p:nvPr>
+        </p:nvSpPr>
+        <p:spPr/>
+        <p:txBody>
+          <a:bodyPr>
+            <a:normAutofit/>
+          </a:bodyPr>
+          <a:lstStyle/>
+          <a:p>
+            <a:r>
+              <a:rPr lang="en-US" dirty="0" smtClean="0"/>
+              <a:t>ML Classification  </a:t>
+            </a:r>
+            <a:endParaRPr lang="en-US" dirty="0"/>
+          </a:p>
+        </p:txBody>
+      </p:sp>
+      <p:sp>
+        <p:nvSpPr>
+          <p:cNvPr id="3" name="Content Placeholder 2"/>
+          <p:cNvSpPr>
+            <a:spLocks noGrp="1"/>
+          </p:cNvSpPr>
+          <p:nvPr>
+            <p:ph idx="1"/>
+          </p:nvPr>
+        </p:nvSpPr>
+        <p:spPr/>
+        <p:txBody>
+          <a:bodyPr>
+            <a:normAutofit/>
+          </a:bodyPr>
+          <a:lstStyle/>
+          <a:p>
+            <a:r>
+              <a:rPr lang="en-IN" dirty="0" smtClean="0"/>
+              <a:t>Supervised learning</a:t>
+            </a:r>
+          </a:p>
+          <a:p>
+            <a:r>
+              <a:rPr lang="en-IN" dirty="0" smtClean="0"/>
+              <a:t>Unsupervised learning</a:t>
+            </a:r>
+          </a:p>
+          <a:p>
+            <a:r>
+              <a:rPr lang="en-IN" dirty="0" smtClean="0"/>
+              <a:t>Reinforcement learning</a:t>
+            </a:r>
+          </a:p>
+          <a:p>
+            <a:r>
+              <a:rPr lang="en-IN" dirty="0" smtClean="0"/>
+              <a:t>Semi supervised learning</a:t>
+            </a:r>
+          </a:p>
+          <a:p>
+            <a:r>
+              <a:rPr lang="en-IN" dirty="0" smtClean="0"/>
+              <a:t>Self supervised learning</a:t>
+            </a:r>
+            <a:endParaRPr lang="en-US" dirty="0" smtClean="0"/>
+          </a:p>
+        </p:txBody>
+      </p:sp>
+    </p:spTree>
+  </p:cSld>
+  <p:clrMapOvr>
+    <a:masterClrMapping/>
+  </p:clrMapOvr>
+  <p:timing>
+    <p:tnLst>
+      <p:par>
+        <p:cTn id="1" dur="indefinite" restart="never" nodeType="tmRoot"/>
+      </p:par>
+    </p:tnLst>
+  </p:timing>
+</p:sld>
+</file>
+
+<file path=ppt/slides/slide11.xml><?xml version="1.0" encoding="utf-8"?>
+<p:sld xmlns:a="http://schemas.openxmlformats.org/drawingml/2006/main" xmlns:r="http://schemas.openxmlformats.org/officeDocument/2006/relationships" xmlns:p="http://schemas.openxmlformats.org/presentationml/2006/main">
+  <p:cSld>
+    <p:spTree>
+      <p:nvGrpSpPr>
+        <p:cNvPr id="1" name=""/>
+        <p:cNvGrpSpPr/>
+        <p:nvPr/>
+      </p:nvGrpSpPr>
+      <p:grpSpPr>
+        <a:xfrm>
+          <a:off x="0" y="0"/>
+          <a:ext cx="0" cy="0"/>
+          <a:chOff x="0" y="0"/>
+          <a:chExt cx="0" cy="0"/>
+        </a:xfrm>
+      </p:grpSpPr>
+      <p:sp>
+        <p:nvSpPr>
+          <p:cNvPr id="2" name="Title 1"/>
+          <p:cNvSpPr>
+            <a:spLocks noGrp="1"/>
+          </p:cNvSpPr>
+          <p:nvPr>
+            <p:ph type="title"/>
+          </p:nvPr>
+        </p:nvSpPr>
+        <p:spPr/>
+        <p:txBody>
+          <a:bodyPr>
+            <a:normAutofit/>
+          </a:bodyPr>
+          <a:lstStyle/>
+          <a:p>
+            <a:r>
+              <a:rPr lang="en-US" dirty="0" smtClean="0"/>
+              <a:t>Supervised </a:t>
+            </a:r>
+            <a:r>
+              <a:rPr lang="en-US" dirty="0" smtClean="0"/>
+              <a:t>Learning </a:t>
+            </a:r>
+            <a:r>
+              <a:rPr lang="en-US" dirty="0" smtClean="0"/>
+              <a:t>– What ?  </a:t>
+            </a:r>
+            <a:endParaRPr lang="en-US" dirty="0"/>
+          </a:p>
+        </p:txBody>
+      </p:sp>
+      <p:sp>
+        <p:nvSpPr>
+          <p:cNvPr id="3" name="Content Placeholder 2"/>
+          <p:cNvSpPr>
+            <a:spLocks noGrp="1"/>
+          </p:cNvSpPr>
+          <p:nvPr>
+            <p:ph idx="1"/>
+          </p:nvPr>
+        </p:nvSpPr>
+        <p:spPr/>
+        <p:txBody>
+          <a:bodyPr>
+            <a:normAutofit/>
+          </a:bodyPr>
+          <a:lstStyle/>
+          <a:p>
+            <a:r>
+              <a:rPr lang="en-US" dirty="0" smtClean="0"/>
+              <a:t>Labeled dataset </a:t>
+            </a:r>
+            <a:endParaRPr lang="en-US" dirty="0" smtClean="0"/>
+          </a:p>
+          <a:p>
+            <a:r>
+              <a:rPr lang="en-US" dirty="0" smtClean="0"/>
+              <a:t>Annotated </a:t>
+            </a:r>
+            <a:r>
+              <a:rPr lang="en-US" dirty="0" smtClean="0"/>
+              <a:t>dataset </a:t>
+            </a:r>
+            <a:endParaRPr lang="en-US" dirty="0" smtClean="0"/>
+          </a:p>
+          <a:p>
+            <a:r>
+              <a:rPr lang="en-US" dirty="0" smtClean="0"/>
+              <a:t>Paired </a:t>
+            </a:r>
+            <a:r>
+              <a:rPr lang="en-US" dirty="0" smtClean="0"/>
+              <a:t>input variables and output variables</a:t>
+            </a:r>
+          </a:p>
+          <a:p>
+            <a:r>
+              <a:rPr lang="en-US" dirty="0" smtClean="0"/>
+              <a:t>Compute mapping from input variables to output variables</a:t>
+            </a:r>
+            <a:endParaRPr lang="en-US" dirty="0" smtClean="0"/>
+          </a:p>
+        </p:txBody>
+      </p:sp>
+    </p:spTree>
+  </p:cSld>
+  <p:clrMapOvr>
+    <a:masterClrMapping/>
+  </p:clrMapOvr>
+  <p:timing>
+    <p:tnLst>
+      <p:par>
+        <p:cTn id="1" dur="indefinite" restart="never" nodeType="tmRoot"/>
+      </p:par>
+    </p:tnLst>
+  </p:timing>
+</p:sld>
+</file>
+
+<file path=ppt/slides/slide12.xml><?xml version="1.0" encoding="utf-8"?>
+<p:sld xmlns:a="http://schemas.openxmlformats.org/drawingml/2006/main" xmlns:r="http://schemas.openxmlformats.org/officeDocument/2006/relationships" xmlns:p="http://schemas.openxmlformats.org/presentationml/2006/main">
+  <p:cSld>
+    <p:spTree>
+      <p:nvGrpSpPr>
+        <p:cNvPr id="1" name=""/>
+        <p:cNvGrpSpPr/>
+        <p:nvPr/>
+      </p:nvGrpSpPr>
+      <p:grpSpPr>
+        <a:xfrm>
+          <a:off x="0" y="0"/>
+          <a:ext cx="0" cy="0"/>
+          <a:chOff x="0" y="0"/>
+          <a:chExt cx="0" cy="0"/>
+        </a:xfrm>
+      </p:grpSpPr>
+      <p:sp>
+        <p:nvSpPr>
+          <p:cNvPr id="2" name="Title 1"/>
+          <p:cNvSpPr>
+            <a:spLocks noGrp="1"/>
+          </p:cNvSpPr>
+          <p:nvPr>
+            <p:ph type="title"/>
+          </p:nvPr>
+        </p:nvSpPr>
+        <p:spPr/>
+        <p:txBody>
+          <a:bodyPr>
+            <a:normAutofit fontScale="90000"/>
+          </a:bodyPr>
+          <a:lstStyle/>
+          <a:p>
+            <a:r>
+              <a:rPr lang="en-US" dirty="0" smtClean="0"/>
+              <a:t>Supervised </a:t>
+            </a:r>
+            <a:r>
+              <a:rPr lang="en-US" dirty="0" smtClean="0"/>
+              <a:t>Learning </a:t>
+            </a:r>
+            <a:r>
+              <a:rPr lang="en-US" dirty="0" smtClean="0"/>
+              <a:t>– Classification  </a:t>
+            </a:r>
+            <a:endParaRPr lang="en-US" dirty="0"/>
+          </a:p>
+        </p:txBody>
+      </p:sp>
+      <p:sp>
+        <p:nvSpPr>
+          <p:cNvPr id="3" name="Content Placeholder 2"/>
+          <p:cNvSpPr>
+            <a:spLocks noGrp="1"/>
+          </p:cNvSpPr>
+          <p:nvPr>
+            <p:ph idx="1"/>
+          </p:nvPr>
+        </p:nvSpPr>
+        <p:spPr/>
+        <p:txBody>
+          <a:bodyPr>
+            <a:normAutofit/>
+          </a:bodyPr>
+          <a:lstStyle/>
+          <a:p>
+            <a:r>
+              <a:rPr lang="en-IN" dirty="0" smtClean="0"/>
+              <a:t>Regression </a:t>
+            </a:r>
+            <a:r>
+              <a:rPr lang="en-IN" dirty="0" smtClean="0"/>
+              <a:t>model </a:t>
+            </a:r>
+            <a:endParaRPr lang="en-IN" dirty="0" smtClean="0"/>
+          </a:p>
+          <a:p>
+            <a:pPr lvl="1"/>
+            <a:r>
+              <a:rPr lang="en-IN" dirty="0" smtClean="0"/>
+              <a:t>Assign </a:t>
+            </a:r>
+            <a:r>
+              <a:rPr lang="en-IN" dirty="0" smtClean="0"/>
+              <a:t>continuous numerical values to dataset </a:t>
+            </a:r>
+            <a:r>
+              <a:rPr lang="en-IN" dirty="0" smtClean="0"/>
+              <a:t>inputs</a:t>
+            </a:r>
+          </a:p>
+          <a:p>
+            <a:pPr lvl="1"/>
+            <a:r>
+              <a:rPr lang="en-IN" dirty="0" smtClean="0"/>
+              <a:t>Example – House price prediction</a:t>
+            </a:r>
+          </a:p>
+          <a:p>
+            <a:r>
+              <a:rPr lang="en-IN" dirty="0" smtClean="0"/>
+              <a:t>Classification model </a:t>
+            </a:r>
+          </a:p>
+          <a:p>
+            <a:pPr lvl="1"/>
+            <a:r>
+              <a:rPr lang="en-IN" dirty="0" smtClean="0"/>
+              <a:t>Assign discrete label or labels from predefined set of categories to dataset inputs</a:t>
+            </a:r>
+          </a:p>
+          <a:p>
+            <a:pPr lvl="1"/>
+            <a:r>
+              <a:rPr lang="en-IN" dirty="0" smtClean="0"/>
+              <a:t>Example – Face </a:t>
+            </a:r>
+            <a:r>
+              <a:rPr lang="en-IN" dirty="0" smtClean="0"/>
+              <a:t>recognition</a:t>
+            </a:r>
+            <a:endParaRPr lang="en-IN" dirty="0" smtClean="0"/>
+          </a:p>
+          <a:p>
+            <a:endParaRPr lang="en-US" dirty="0" smtClean="0"/>
+          </a:p>
+        </p:txBody>
+      </p:sp>
+    </p:spTree>
+  </p:cSld>
+  <p:clrMapOvr>
+    <a:masterClrMapping/>
+  </p:clrMapOvr>
+  <p:timing>
+    <p:tnLst>
+      <p:par>
+        <p:cTn id="1" dur="indefinite" restart="never" nodeType="tmRoot"/>
+      </p:par>
+    </p:tnLst>
+  </p:timing>
+</p:sld>
+</file>
+
+<file path=ppt/slides/slide13.xml><?xml version="1.0" encoding="utf-8"?>
+<p:sld xmlns:a="http://schemas.openxmlformats.org/drawingml/2006/main" xmlns:r="http://schemas.openxmlformats.org/officeDocument/2006/relationships" xmlns:p="http://schemas.openxmlformats.org/presentationml/2006/main">
+  <p:cSld>
+    <p:spTree>
+      <p:nvGrpSpPr>
+        <p:cNvPr id="1" name=""/>
+        <p:cNvGrpSpPr/>
+        <p:nvPr/>
+      </p:nvGrpSpPr>
+      <p:grpSpPr>
+        <a:xfrm>
+          <a:off x="0" y="0"/>
+          <a:ext cx="0" cy="0"/>
+          <a:chOff x="0" y="0"/>
+          <a:chExt cx="0" cy="0"/>
+        </a:xfrm>
+      </p:grpSpPr>
+      <p:sp>
+        <p:nvSpPr>
+          <p:cNvPr id="2" name="Title 1"/>
+          <p:cNvSpPr>
+            <a:spLocks noGrp="1"/>
+          </p:cNvSpPr>
+          <p:nvPr>
+            <p:ph type="title"/>
+          </p:nvPr>
+        </p:nvSpPr>
+        <p:spPr/>
+        <p:txBody>
+          <a:bodyPr>
+            <a:normAutofit/>
+          </a:bodyPr>
+          <a:lstStyle/>
+          <a:p>
+            <a:r>
+              <a:rPr lang="en-US" dirty="0" smtClean="0"/>
+              <a:t>Supervised </a:t>
+            </a:r>
+            <a:r>
+              <a:rPr lang="en-US" dirty="0" smtClean="0"/>
+              <a:t>Learning – Example (1)  </a:t>
+            </a:r>
+            <a:endParaRPr lang="en-US" dirty="0"/>
+          </a:p>
+        </p:txBody>
+      </p:sp>
+      <p:sp>
+        <p:nvSpPr>
+          <p:cNvPr id="3" name="Content Placeholder 2"/>
+          <p:cNvSpPr>
+            <a:spLocks noGrp="1"/>
+          </p:cNvSpPr>
+          <p:nvPr>
+            <p:ph idx="1"/>
+          </p:nvPr>
+        </p:nvSpPr>
+        <p:spPr/>
+        <p:txBody>
+          <a:bodyPr>
+            <a:normAutofit lnSpcReduction="10000"/>
+          </a:bodyPr>
+          <a:lstStyle/>
+          <a:p>
+            <a:r>
+              <a:rPr lang="en-IN" dirty="0" smtClean="0"/>
+              <a:t>House price prediction </a:t>
+            </a:r>
+            <a:r>
+              <a:rPr lang="en-IN" dirty="0" smtClean="0"/>
+              <a:t>– Regression model</a:t>
+            </a:r>
+            <a:endParaRPr lang="en-IN" dirty="0" smtClean="0"/>
+          </a:p>
+          <a:p>
+            <a:pPr lvl="1"/>
+            <a:r>
+              <a:rPr lang="en-IN" dirty="0" smtClean="0"/>
+              <a:t>Input variables </a:t>
+            </a:r>
+            <a:endParaRPr lang="en-IN" dirty="0" smtClean="0"/>
+          </a:p>
+          <a:p>
+            <a:pPr lvl="2"/>
+            <a:r>
+              <a:rPr lang="en-IN" dirty="0" smtClean="0"/>
+              <a:t>Number of bedrooms</a:t>
+            </a:r>
+          </a:p>
+          <a:p>
+            <a:pPr lvl="2"/>
+            <a:r>
+              <a:rPr lang="en-IN" dirty="0" smtClean="0"/>
+              <a:t>Area </a:t>
+            </a:r>
+            <a:r>
+              <a:rPr lang="en-IN" dirty="0" smtClean="0"/>
+              <a:t>of </a:t>
+            </a:r>
+            <a:r>
+              <a:rPr lang="en-IN" dirty="0" smtClean="0"/>
+              <a:t>house </a:t>
+            </a:r>
+          </a:p>
+          <a:p>
+            <a:pPr lvl="2"/>
+            <a:r>
+              <a:rPr lang="en-IN" dirty="0" smtClean="0"/>
+              <a:t>Locality </a:t>
+            </a:r>
+            <a:r>
+              <a:rPr lang="en-IN" dirty="0" smtClean="0"/>
+              <a:t>of house and so on</a:t>
+            </a:r>
+          </a:p>
+          <a:p>
+            <a:pPr lvl="1"/>
+            <a:r>
+              <a:rPr lang="en-IN" dirty="0" smtClean="0"/>
+              <a:t>Output variable </a:t>
+            </a:r>
+            <a:endParaRPr lang="en-IN" dirty="0" smtClean="0"/>
+          </a:p>
+          <a:p>
+            <a:pPr lvl="2"/>
+            <a:r>
+              <a:rPr lang="en-IN" dirty="0" smtClean="0"/>
+              <a:t>Price of </a:t>
+            </a:r>
+            <a:r>
+              <a:rPr lang="en-IN" dirty="0" smtClean="0"/>
+              <a:t>house</a:t>
+            </a:r>
+          </a:p>
+          <a:p>
+            <a:pPr lvl="1"/>
+            <a:r>
+              <a:rPr lang="en-IN" dirty="0" smtClean="0"/>
+              <a:t>Optimization function </a:t>
+            </a:r>
+            <a:endParaRPr lang="en-IN" dirty="0" smtClean="0"/>
+          </a:p>
+          <a:p>
+            <a:pPr lvl="2"/>
+            <a:r>
+              <a:rPr lang="en-IN" dirty="0" smtClean="0"/>
+              <a:t>Reduce error </a:t>
+            </a:r>
+            <a:r>
+              <a:rPr lang="en-IN" dirty="0" smtClean="0"/>
+              <a:t>between predicted and actual price of </a:t>
+            </a:r>
+            <a:r>
+              <a:rPr lang="en-IN" dirty="0" smtClean="0"/>
+              <a:t>house</a:t>
+            </a:r>
+            <a:endParaRPr lang="en-US" dirty="0" smtClean="0"/>
+          </a:p>
+        </p:txBody>
+      </p:sp>
+    </p:spTree>
+  </p:cSld>
+  <p:clrMapOvr>
+    <a:masterClrMapping/>
+  </p:clrMapOvr>
+  <p:timing>
+    <p:tnLst>
+      <p:par>
+        <p:cTn id="1" dur="indefinite" restart="never" nodeType="tmRoot"/>
+      </p:par>
+    </p:tnLst>
+  </p:timing>
+</p:sld>
+</file>
+
+<file path=ppt/slides/slide14.xml><?xml version="1.0" encoding="utf-8"?>
+<p:sld xmlns:a="http://schemas.openxmlformats.org/drawingml/2006/main" xmlns:r="http://schemas.openxmlformats.org/officeDocument/2006/relationships" xmlns:p="http://schemas.openxmlformats.org/presentationml/2006/main">
+  <p:cSld>
+    <p:spTree>
+      <p:nvGrpSpPr>
+        <p:cNvPr id="1" name=""/>
+        <p:cNvGrpSpPr/>
+        <p:nvPr/>
+      </p:nvGrpSpPr>
+      <p:grpSpPr>
+        <a:xfrm>
+          <a:off x="0" y="0"/>
+          <a:ext cx="0" cy="0"/>
+          <a:chOff x="0" y="0"/>
+          <a:chExt cx="0" cy="0"/>
+        </a:xfrm>
+      </p:grpSpPr>
+      <p:sp>
+        <p:nvSpPr>
+          <p:cNvPr id="2" name="Title 1"/>
+          <p:cNvSpPr>
+            <a:spLocks noGrp="1"/>
+          </p:cNvSpPr>
+          <p:nvPr>
+            <p:ph type="title"/>
+          </p:nvPr>
+        </p:nvSpPr>
+        <p:spPr/>
+        <p:txBody>
+          <a:bodyPr>
+            <a:normAutofit/>
+          </a:bodyPr>
+          <a:lstStyle/>
+          <a:p>
+            <a:r>
+              <a:rPr lang="en-US" dirty="0" smtClean="0"/>
+              <a:t>Supervised </a:t>
+            </a:r>
+            <a:r>
+              <a:rPr lang="en-US" dirty="0" smtClean="0"/>
+              <a:t>Learning – Example (2)  </a:t>
+            </a:r>
+            <a:endParaRPr lang="en-US" dirty="0"/>
+          </a:p>
+        </p:txBody>
+      </p:sp>
+      <p:sp>
+        <p:nvSpPr>
+          <p:cNvPr id="3" name="Content Placeholder 2"/>
+          <p:cNvSpPr>
+            <a:spLocks noGrp="1"/>
+          </p:cNvSpPr>
+          <p:nvPr>
+            <p:ph idx="1"/>
+          </p:nvPr>
+        </p:nvSpPr>
+        <p:spPr/>
+        <p:txBody>
+          <a:bodyPr>
+            <a:normAutofit/>
+          </a:bodyPr>
+          <a:lstStyle/>
+          <a:p>
+            <a:r>
+              <a:rPr lang="en-IN" dirty="0" smtClean="0"/>
+              <a:t>Face </a:t>
+            </a:r>
+            <a:r>
+              <a:rPr lang="en-IN" dirty="0" smtClean="0"/>
+              <a:t>recognition </a:t>
+            </a:r>
+            <a:r>
+              <a:rPr lang="en-IN" dirty="0" smtClean="0"/>
+              <a:t>– Classification model</a:t>
+            </a:r>
+            <a:endParaRPr lang="en-IN" dirty="0" smtClean="0"/>
+          </a:p>
+          <a:p>
+            <a:pPr lvl="1"/>
+            <a:r>
+              <a:rPr lang="en-IN" dirty="0" smtClean="0"/>
+              <a:t>Input variables </a:t>
+            </a:r>
+            <a:endParaRPr lang="en-IN" dirty="0" smtClean="0"/>
+          </a:p>
+          <a:p>
+            <a:pPr lvl="2"/>
+            <a:r>
+              <a:rPr lang="en-IN" dirty="0" smtClean="0"/>
+              <a:t>Input cropped </a:t>
+            </a:r>
+            <a:r>
+              <a:rPr lang="en-IN" dirty="0" smtClean="0"/>
+              <a:t>images</a:t>
+            </a:r>
+          </a:p>
+          <a:p>
+            <a:pPr lvl="1"/>
+            <a:r>
+              <a:rPr lang="en-IN" dirty="0" smtClean="0"/>
+              <a:t>Output variable </a:t>
+            </a:r>
+            <a:endParaRPr lang="en-IN" dirty="0" smtClean="0"/>
+          </a:p>
+          <a:p>
+            <a:pPr lvl="2"/>
+            <a:r>
+              <a:rPr lang="en-IN" dirty="0" smtClean="0"/>
+              <a:t>Identity of </a:t>
+            </a:r>
+            <a:r>
+              <a:rPr lang="en-IN" dirty="0" smtClean="0"/>
+              <a:t>person</a:t>
+            </a:r>
+          </a:p>
+          <a:p>
+            <a:pPr lvl="1"/>
+            <a:r>
+              <a:rPr lang="en-IN" dirty="0" smtClean="0"/>
+              <a:t>Optimization function </a:t>
+            </a:r>
+            <a:endParaRPr lang="en-IN" dirty="0" smtClean="0"/>
+          </a:p>
+          <a:p>
+            <a:pPr lvl="2"/>
+            <a:r>
+              <a:rPr lang="en-IN" dirty="0" smtClean="0"/>
+              <a:t>Reduce classification </a:t>
+            </a:r>
+            <a:r>
+              <a:rPr lang="en-IN" dirty="0" smtClean="0"/>
+              <a:t>error</a:t>
+            </a:r>
+            <a:endParaRPr lang="en-US" dirty="0" smtClean="0"/>
+          </a:p>
+        </p:txBody>
+      </p:sp>
+    </p:spTree>
+  </p:cSld>
+  <p:clrMapOvr>
+    <a:masterClrMapping/>
+  </p:clrMapOvr>
+  <p:timing>
+    <p:tnLst>
+      <p:par>
+        <p:cTn id="1" dur="indefinite" restart="never" nodeType="tmRoot"/>
+      </p:par>
+    </p:tnLst>
+  </p:timing>
+</p:sld>
+</file>
+
+<file path=ppt/slides/slide15.xml><?xml version="1.0" encoding="utf-8"?>
+<p:sld xmlns:a="http://schemas.openxmlformats.org/drawingml/2006/main" xmlns:r="http://schemas.openxmlformats.org/officeDocument/2006/relationships" xmlns:p="http://schemas.openxmlformats.org/presentationml/2006/main">
+  <p:cSld>
+    <p:spTree>
+      <p:nvGrpSpPr>
+        <p:cNvPr id="1" name=""/>
+        <p:cNvGrpSpPr/>
+        <p:nvPr/>
+      </p:nvGrpSpPr>
+      <p:grpSpPr>
+        <a:xfrm>
+          <a:off x="0" y="0"/>
+          <a:ext cx="0" cy="0"/>
+          <a:chOff x="0" y="0"/>
+          <a:chExt cx="0" cy="0"/>
+        </a:xfrm>
+      </p:grpSpPr>
+      <p:sp>
+        <p:nvSpPr>
+          <p:cNvPr id="2" name="Title 1"/>
+          <p:cNvSpPr>
+            <a:spLocks noGrp="1"/>
+          </p:cNvSpPr>
+          <p:nvPr>
+            <p:ph type="title"/>
+          </p:nvPr>
+        </p:nvSpPr>
+        <p:spPr/>
+        <p:txBody>
+          <a:bodyPr>
+            <a:normAutofit/>
+          </a:bodyPr>
+          <a:lstStyle/>
+          <a:p>
+            <a:r>
+              <a:rPr lang="en-US" dirty="0" smtClean="0"/>
+              <a:t>Unsupervised </a:t>
+            </a:r>
+            <a:r>
+              <a:rPr lang="en-US" dirty="0" smtClean="0"/>
+              <a:t>Learning </a:t>
+            </a:r>
+            <a:r>
+              <a:rPr lang="en-US" dirty="0" smtClean="0"/>
+              <a:t>– What ?  </a:t>
+            </a:r>
+            <a:endParaRPr lang="en-US" dirty="0"/>
+          </a:p>
+        </p:txBody>
+      </p:sp>
+      <p:sp>
+        <p:nvSpPr>
+          <p:cNvPr id="3" name="Content Placeholder 2"/>
+          <p:cNvSpPr>
+            <a:spLocks noGrp="1"/>
+          </p:cNvSpPr>
+          <p:nvPr>
+            <p:ph idx="1"/>
+          </p:nvPr>
+        </p:nvSpPr>
+        <p:spPr/>
+        <p:txBody>
+          <a:bodyPr>
+            <a:normAutofit/>
+          </a:bodyPr>
+          <a:lstStyle/>
+          <a:p>
+            <a:r>
+              <a:rPr lang="en-IN" dirty="0" smtClean="0"/>
+              <a:t>Unlabeled dataset </a:t>
+            </a:r>
+            <a:endParaRPr lang="en-IN" dirty="0" smtClean="0"/>
+          </a:p>
+          <a:p>
+            <a:r>
+              <a:rPr lang="en-IN" dirty="0" smtClean="0"/>
+              <a:t>No </a:t>
+            </a:r>
+            <a:r>
+              <a:rPr lang="en-IN" dirty="0" smtClean="0"/>
+              <a:t>annotations </a:t>
+            </a:r>
+            <a:endParaRPr lang="en-IN" dirty="0" smtClean="0"/>
+          </a:p>
+          <a:p>
+            <a:r>
+              <a:rPr lang="en-IN" dirty="0" smtClean="0"/>
+              <a:t>Only </a:t>
+            </a:r>
+            <a:r>
+              <a:rPr lang="en-IN" dirty="0" smtClean="0"/>
+              <a:t>input variables </a:t>
+            </a:r>
+            <a:endParaRPr lang="en-IN" dirty="0" smtClean="0"/>
+          </a:p>
+          <a:p>
+            <a:r>
+              <a:rPr lang="en-IN" dirty="0" smtClean="0"/>
+              <a:t>No </a:t>
+            </a:r>
+            <a:r>
+              <a:rPr lang="en-IN" dirty="0" smtClean="0"/>
+              <a:t>output variables or output </a:t>
+            </a:r>
+            <a:r>
+              <a:rPr lang="en-IN" dirty="0" smtClean="0"/>
+              <a:t>annotations</a:t>
+            </a:r>
+            <a:endParaRPr lang="en-IN" dirty="0" smtClean="0"/>
+          </a:p>
+        </p:txBody>
+      </p:sp>
+    </p:spTree>
+  </p:cSld>
+  <p:clrMapOvr>
+    <a:masterClrMapping/>
+  </p:clrMapOvr>
+  <p:timing>
+    <p:tnLst>
+      <p:par>
+        <p:cTn id="1" dur="indefinite" restart="never" nodeType="tmRoot"/>
+      </p:par>
+    </p:tnLst>
+  </p:timing>
+</p:sld>
+</file>
+
+<file path=ppt/slides/slide16.xml><?xml version="1.0" encoding="utf-8"?>
+<p:sld xmlns:a="http://schemas.openxmlformats.org/drawingml/2006/main" xmlns:r="http://schemas.openxmlformats.org/officeDocument/2006/relationships" xmlns:p="http://schemas.openxmlformats.org/presentationml/2006/main">
+  <p:cSld>
+    <p:spTree>
+      <p:nvGrpSpPr>
+        <p:cNvPr id="1" name=""/>
+        <p:cNvGrpSpPr/>
+        <p:nvPr/>
+      </p:nvGrpSpPr>
+      <p:grpSpPr>
+        <a:xfrm>
+          <a:off x="0" y="0"/>
+          <a:ext cx="0" cy="0"/>
+          <a:chOff x="0" y="0"/>
+          <a:chExt cx="0" cy="0"/>
+        </a:xfrm>
+      </p:grpSpPr>
+      <p:sp>
+        <p:nvSpPr>
+          <p:cNvPr id="2" name="Title 1"/>
+          <p:cNvSpPr>
+            <a:spLocks noGrp="1"/>
+          </p:cNvSpPr>
+          <p:nvPr>
+            <p:ph type="title"/>
+          </p:nvPr>
+        </p:nvSpPr>
+        <p:spPr/>
+        <p:txBody>
+          <a:bodyPr>
+            <a:normAutofit fontScale="90000"/>
+          </a:bodyPr>
+          <a:lstStyle/>
+          <a:p>
+            <a:r>
+              <a:rPr lang="en-US" dirty="0" smtClean="0"/>
+              <a:t>Unsupervised </a:t>
+            </a:r>
+            <a:r>
+              <a:rPr lang="en-US" dirty="0" smtClean="0"/>
+              <a:t>Learning </a:t>
+            </a:r>
+            <a:r>
+              <a:rPr lang="en-US" dirty="0" smtClean="0"/>
+              <a:t>– Classification  </a:t>
+            </a:r>
+            <a:endParaRPr lang="en-US" dirty="0"/>
+          </a:p>
+        </p:txBody>
+      </p:sp>
+      <p:sp>
+        <p:nvSpPr>
+          <p:cNvPr id="3" name="Content Placeholder 2"/>
+          <p:cNvSpPr>
+            <a:spLocks noGrp="1"/>
+          </p:cNvSpPr>
+          <p:nvPr>
+            <p:ph idx="1"/>
+          </p:nvPr>
+        </p:nvSpPr>
+        <p:spPr/>
+        <p:txBody>
+          <a:bodyPr>
+            <a:normAutofit/>
+          </a:bodyPr>
+          <a:lstStyle/>
+          <a:p>
+            <a:r>
+              <a:rPr lang="en-IN" dirty="0" smtClean="0"/>
+              <a:t>Clustering</a:t>
+            </a:r>
+          </a:p>
+          <a:p>
+            <a:pPr lvl="1"/>
+            <a:r>
+              <a:rPr lang="en-IN" dirty="0" smtClean="0"/>
+              <a:t>Cluster </a:t>
+            </a:r>
+            <a:r>
+              <a:rPr lang="en-IN" dirty="0" smtClean="0"/>
+              <a:t>or group input </a:t>
+            </a:r>
+            <a:r>
+              <a:rPr lang="en-IN" dirty="0" smtClean="0"/>
+              <a:t>variables</a:t>
+            </a:r>
+          </a:p>
+          <a:p>
+            <a:r>
+              <a:rPr lang="en-IN" dirty="0" smtClean="0"/>
+              <a:t>Feature </a:t>
+            </a:r>
+            <a:r>
+              <a:rPr lang="en-IN" dirty="0" smtClean="0"/>
+              <a:t>learning</a:t>
+            </a:r>
+          </a:p>
+          <a:p>
+            <a:pPr lvl="1"/>
+            <a:r>
+              <a:rPr lang="en-IN" dirty="0" smtClean="0"/>
+              <a:t>Learn </a:t>
+            </a:r>
+            <a:r>
+              <a:rPr lang="en-IN" dirty="0" smtClean="0"/>
+              <a:t>features or patterns from input </a:t>
+            </a:r>
+            <a:r>
+              <a:rPr lang="en-IN" dirty="0" smtClean="0"/>
+              <a:t>variables</a:t>
+            </a:r>
+            <a:endParaRPr lang="en-IN" dirty="0" smtClean="0"/>
+          </a:p>
+          <a:p>
+            <a:r>
+              <a:rPr lang="en-IN" dirty="0" smtClean="0"/>
+              <a:t>Association </a:t>
+            </a:r>
+            <a:r>
+              <a:rPr lang="en-IN" dirty="0" smtClean="0"/>
+              <a:t>rules </a:t>
+            </a:r>
+            <a:r>
+              <a:rPr lang="en-IN" dirty="0" smtClean="0"/>
+              <a:t>learning </a:t>
+            </a:r>
+            <a:endParaRPr lang="en-IN" dirty="0" smtClean="0"/>
+          </a:p>
+          <a:p>
+            <a:pPr lvl="1"/>
+            <a:r>
+              <a:rPr lang="en-IN" dirty="0" smtClean="0"/>
+              <a:t>Find </a:t>
+            </a:r>
+            <a:r>
+              <a:rPr lang="en-IN" dirty="0" smtClean="0"/>
+              <a:t>relationships between input </a:t>
+            </a:r>
+            <a:r>
+              <a:rPr lang="en-IN" dirty="0" smtClean="0"/>
+              <a:t>variables</a:t>
+            </a:r>
+            <a:endParaRPr lang="en-US" dirty="0" smtClean="0"/>
+          </a:p>
+        </p:txBody>
+      </p:sp>
+    </p:spTree>
+  </p:cSld>
+  <p:clrMapOvr>
+    <a:masterClrMapping/>
+  </p:clrMapOvr>
+  <p:timing>
+    <p:tnLst>
+      <p:par>
+        <p:cTn id="1" dur="indefinite" restart="never" nodeType="tmRoot"/>
+      </p:par>
+    </p:tnLst>
+  </p:timing>
+</p:sld>
+</file>
+
+<file path=ppt/slides/slide17.xml><?xml version="1.0" encoding="utf-8"?>
+<p:sld xmlns:a="http://schemas.openxmlformats.org/drawingml/2006/main" xmlns:r="http://schemas.openxmlformats.org/officeDocument/2006/relationships" xmlns:p="http://schemas.openxmlformats.org/presentationml/2006/main">
+  <p:cSld>
+    <p:spTree>
+      <p:nvGrpSpPr>
+        <p:cNvPr id="1" name=""/>
+        <p:cNvGrpSpPr/>
+        <p:nvPr/>
+      </p:nvGrpSpPr>
+      <p:grpSpPr>
+        <a:xfrm>
+          <a:off x="0" y="0"/>
+          <a:ext cx="0" cy="0"/>
+          <a:chOff x="0" y="0"/>
+          <a:chExt cx="0" cy="0"/>
+        </a:xfrm>
+      </p:grpSpPr>
+      <p:sp>
+        <p:nvSpPr>
+          <p:cNvPr id="2" name="Title 1"/>
+          <p:cNvSpPr>
+            <a:spLocks noGrp="1"/>
+          </p:cNvSpPr>
+          <p:nvPr>
+            <p:ph type="title"/>
+          </p:nvPr>
+        </p:nvSpPr>
+        <p:spPr/>
+        <p:txBody>
+          <a:bodyPr>
+            <a:normAutofit/>
+          </a:bodyPr>
+          <a:lstStyle/>
+          <a:p>
+            <a:r>
+              <a:rPr lang="en-US" dirty="0" smtClean="0"/>
+              <a:t>Unsupervised </a:t>
+            </a:r>
+            <a:r>
+              <a:rPr lang="en-US" dirty="0" smtClean="0"/>
+              <a:t>Learning – Examples  </a:t>
+            </a:r>
+            <a:endParaRPr lang="en-US" dirty="0"/>
+          </a:p>
+        </p:txBody>
+      </p:sp>
+      <p:sp>
+        <p:nvSpPr>
+          <p:cNvPr id="3" name="Content Placeholder 2"/>
+          <p:cNvSpPr>
+            <a:spLocks noGrp="1"/>
+          </p:cNvSpPr>
+          <p:nvPr>
+            <p:ph idx="1"/>
+          </p:nvPr>
+        </p:nvSpPr>
+        <p:spPr/>
+        <p:txBody>
+          <a:bodyPr>
+            <a:normAutofit/>
+          </a:bodyPr>
+          <a:lstStyle/>
+          <a:p>
+            <a:r>
+              <a:rPr lang="en-IN" dirty="0" smtClean="0"/>
+              <a:t>Association </a:t>
+            </a:r>
+            <a:r>
+              <a:rPr lang="en-IN" dirty="0" smtClean="0"/>
+              <a:t>rule learning </a:t>
+            </a:r>
+          </a:p>
+          <a:p>
+            <a:r>
+              <a:rPr lang="en-IN" dirty="0" err="1" smtClean="0"/>
+              <a:t>Apriori</a:t>
+            </a:r>
+            <a:r>
+              <a:rPr lang="en-IN" dirty="0" smtClean="0"/>
+              <a:t> algorithm</a:t>
+            </a:r>
+            <a:endParaRPr lang="en-IN" dirty="0" smtClean="0"/>
+          </a:p>
+          <a:p>
+            <a:r>
+              <a:rPr lang="en-IN" dirty="0" smtClean="0"/>
+              <a:t>If a person buys Bread then he also buys </a:t>
+            </a:r>
+            <a:r>
+              <a:rPr lang="en-IN" dirty="0" smtClean="0"/>
+              <a:t>Jam.</a:t>
+            </a:r>
+          </a:p>
+          <a:p>
+            <a:pPr lvl="1"/>
+            <a:r>
+              <a:rPr lang="en-IN" dirty="0" smtClean="0"/>
+              <a:t>Bread </a:t>
+            </a:r>
+            <a:r>
+              <a:rPr lang="en-IN" dirty="0" smtClean="0"/>
+              <a:t>and Jam are bought together</a:t>
+            </a:r>
+          </a:p>
+          <a:p>
+            <a:r>
+              <a:rPr lang="en-IN" dirty="0" smtClean="0"/>
+              <a:t>If a person buys Laptop then he also buys </a:t>
+            </a:r>
+            <a:r>
+              <a:rPr lang="en-IN" dirty="0" smtClean="0"/>
+              <a:t>laptop </a:t>
+            </a:r>
+            <a:r>
+              <a:rPr lang="en-IN" dirty="0" smtClean="0"/>
+              <a:t>bag. </a:t>
+            </a:r>
+            <a:endParaRPr lang="en-IN" dirty="0" smtClean="0"/>
+          </a:p>
+          <a:p>
+            <a:pPr lvl="1"/>
+            <a:r>
+              <a:rPr lang="en-IN" dirty="0" smtClean="0"/>
+              <a:t>Laptop </a:t>
+            </a:r>
+            <a:r>
+              <a:rPr lang="en-IN" dirty="0" smtClean="0"/>
+              <a:t>and </a:t>
+            </a:r>
+            <a:r>
+              <a:rPr lang="en-IN" dirty="0" smtClean="0"/>
+              <a:t>laptop </a:t>
+            </a:r>
+            <a:r>
+              <a:rPr lang="en-IN" dirty="0" smtClean="0"/>
+              <a:t>bag are bought together</a:t>
+            </a:r>
+          </a:p>
+          <a:p>
+            <a:endParaRPr lang="en-US" dirty="0" smtClean="0"/>
+          </a:p>
+        </p:txBody>
+      </p:sp>
+    </p:spTree>
+  </p:cSld>
+  <p:clrMapOvr>
+    <a:masterClrMapping/>
+  </p:clrMapOvr>
+  <p:timing>
+    <p:tnLst>
+      <p:par>
+        <p:cTn id="1" dur="indefinite" restart="never" nodeType="tmRoot"/>
+      </p:par>
+    </p:tnLst>
+  </p:timing>
+</p:sld>
+</file>
+
+<file path=ppt/slides/slide18.xml><?xml version="1.0" encoding="utf-8"?>
+<p:sld xmlns:a="http://schemas.openxmlformats.org/drawingml/2006/main" xmlns:r="http://schemas.openxmlformats.org/officeDocument/2006/relationships" xmlns:p="http://schemas.openxmlformats.org/presentationml/2006/main">
+  <p:cSld>
+    <p:spTree>
+      <p:nvGrpSpPr>
+        <p:cNvPr id="1" name=""/>
+        <p:cNvGrpSpPr/>
+        <p:nvPr/>
+      </p:nvGrpSpPr>
+      <p:grpSpPr>
+        <a:xfrm>
+          <a:off x="0" y="0"/>
+          <a:ext cx="0" cy="0"/>
+          <a:chOff x="0" y="0"/>
+          <a:chExt cx="0" cy="0"/>
+        </a:xfrm>
+      </p:grpSpPr>
+      <p:sp>
+        <p:nvSpPr>
+          <p:cNvPr id="2" name="Title 1"/>
+          <p:cNvSpPr>
+            <a:spLocks noGrp="1"/>
+          </p:cNvSpPr>
+          <p:nvPr>
+            <p:ph type="title"/>
+          </p:nvPr>
+        </p:nvSpPr>
+        <p:spPr/>
+        <p:txBody>
+          <a:bodyPr>
+            <a:normAutofit/>
+          </a:bodyPr>
+          <a:lstStyle/>
+          <a:p>
+            <a:r>
+              <a:rPr lang="en-US" dirty="0" smtClean="0"/>
+              <a:t>Unsupervised </a:t>
+            </a:r>
+            <a:r>
+              <a:rPr lang="en-US" dirty="0" smtClean="0"/>
+              <a:t>Learning – Examples  </a:t>
+            </a:r>
+            <a:endParaRPr lang="en-US" dirty="0"/>
+          </a:p>
+        </p:txBody>
+      </p:sp>
+      <p:sp>
+        <p:nvSpPr>
+          <p:cNvPr id="3" name="Content Placeholder 2"/>
+          <p:cNvSpPr>
+            <a:spLocks noGrp="1"/>
+          </p:cNvSpPr>
+          <p:nvPr>
+            <p:ph idx="1"/>
+          </p:nvPr>
+        </p:nvSpPr>
+        <p:spPr/>
+        <p:txBody>
+          <a:bodyPr>
+            <a:normAutofit fontScale="92500" lnSpcReduction="10000"/>
+          </a:bodyPr>
+          <a:lstStyle/>
+          <a:p>
+            <a:r>
+              <a:rPr lang="en-IN" dirty="0" smtClean="0"/>
+              <a:t>Clustering</a:t>
+            </a:r>
+            <a:endParaRPr lang="en-IN" dirty="0" smtClean="0"/>
+          </a:p>
+          <a:p>
+            <a:r>
+              <a:rPr lang="en-IN" dirty="0" smtClean="0"/>
+              <a:t>Customer </a:t>
+            </a:r>
+            <a:r>
+              <a:rPr lang="en-IN" dirty="0" smtClean="0"/>
+              <a:t>segmentation for different shirt sizes</a:t>
+            </a:r>
+            <a:endParaRPr lang="en-IN" dirty="0" smtClean="0"/>
+          </a:p>
+          <a:p>
+            <a:pPr lvl="1"/>
+            <a:r>
+              <a:rPr lang="en-IN" dirty="0" smtClean="0"/>
+              <a:t>Input variables </a:t>
+            </a:r>
+            <a:endParaRPr lang="en-IN" dirty="0" smtClean="0"/>
+          </a:p>
+          <a:p>
+            <a:pPr lvl="2"/>
+            <a:r>
+              <a:rPr lang="en-IN" dirty="0" smtClean="0"/>
+              <a:t>Number of </a:t>
+            </a:r>
+            <a:r>
+              <a:rPr lang="en-IN" dirty="0" smtClean="0"/>
+              <a:t>size measurements for </a:t>
+            </a:r>
+            <a:r>
+              <a:rPr lang="en-IN" dirty="0" smtClean="0"/>
+              <a:t>customers</a:t>
+            </a:r>
+          </a:p>
+          <a:p>
+            <a:pPr lvl="1"/>
+            <a:r>
+              <a:rPr lang="en-IN" dirty="0" smtClean="0"/>
+              <a:t>Output </a:t>
+            </a:r>
+          </a:p>
+          <a:p>
+            <a:pPr lvl="2"/>
+            <a:r>
+              <a:rPr lang="en-IN" dirty="0" smtClean="0"/>
+              <a:t>Clustered number </a:t>
+            </a:r>
+            <a:r>
+              <a:rPr lang="en-IN" dirty="0" smtClean="0"/>
+              <a:t>of shirt sizes </a:t>
+            </a:r>
+            <a:r>
+              <a:rPr lang="en-IN" dirty="0" smtClean="0"/>
+              <a:t>(small, </a:t>
+            </a:r>
+            <a:r>
+              <a:rPr lang="en-IN" dirty="0" smtClean="0"/>
+              <a:t>medium, </a:t>
+            </a:r>
+            <a:r>
+              <a:rPr lang="en-IN" dirty="0" smtClean="0"/>
+              <a:t>and large)</a:t>
+            </a:r>
+            <a:endParaRPr lang="en-IN" dirty="0" smtClean="0"/>
+          </a:p>
+          <a:p>
+            <a:pPr lvl="1"/>
+            <a:r>
+              <a:rPr lang="en-IN" dirty="0" smtClean="0"/>
+              <a:t>Optimization function </a:t>
+            </a:r>
+            <a:endParaRPr lang="en-IN" dirty="0" smtClean="0"/>
+          </a:p>
+          <a:p>
+            <a:pPr lvl="2"/>
+            <a:r>
+              <a:rPr lang="en-IN" dirty="0" smtClean="0"/>
+              <a:t>No </a:t>
+            </a:r>
+            <a:r>
+              <a:rPr lang="en-IN" dirty="0" smtClean="0"/>
+              <a:t>accuracy</a:t>
+            </a:r>
+          </a:p>
+          <a:p>
+            <a:pPr lvl="2"/>
+            <a:r>
+              <a:rPr lang="en-IN" dirty="0" smtClean="0"/>
+              <a:t>Decrease distance between samples from same cluster</a:t>
+            </a:r>
+          </a:p>
+          <a:p>
+            <a:pPr lvl="2"/>
+            <a:r>
+              <a:rPr lang="en-IN" dirty="0" smtClean="0"/>
+              <a:t>Increase distance between samples from different </a:t>
+            </a:r>
+            <a:r>
+              <a:rPr lang="en-IN" dirty="0" smtClean="0"/>
+              <a:t>clusters</a:t>
+            </a:r>
+            <a:endParaRPr lang="en-US" dirty="0" smtClean="0"/>
+          </a:p>
+        </p:txBody>
+      </p:sp>
+    </p:spTree>
+  </p:cSld>
+  <p:clrMapOvr>
+    <a:masterClrMapping/>
+  </p:clrMapOvr>
+  <p:timing>
+    <p:tnLst>
+      <p:par>
+        <p:cTn id="1" dur="indefinite" restart="never" nodeType="tmRoot"/>
+      </p:par>
+    </p:tnLst>
+  </p:timing>
+</p:sld>
+</file>
+
+<file path=ppt/slides/slide19.xml><?xml version="1.0" encoding="utf-8"?>
+<p:sld xmlns:a="http://schemas.openxmlformats.org/drawingml/2006/main" xmlns:r="http://schemas.openxmlformats.org/officeDocument/2006/relationships" xmlns:p="http://schemas.openxmlformats.org/presentationml/2006/main">
+  <p:cSld>
+    <p:spTree>
+      <p:nvGrpSpPr>
+        <p:cNvPr id="1" name=""/>
+        <p:cNvGrpSpPr/>
+        <p:nvPr/>
+      </p:nvGrpSpPr>
+      <p:grpSpPr>
+        <a:xfrm>
+          <a:off x="0" y="0"/>
+          <a:ext cx="0" cy="0"/>
+          <a:chOff x="0" y="0"/>
+          <a:chExt cx="0" cy="0"/>
+        </a:xfrm>
+      </p:grpSpPr>
+      <p:sp>
+        <p:nvSpPr>
+          <p:cNvPr id="2" name="Title 1"/>
+          <p:cNvSpPr>
+            <a:spLocks noGrp="1"/>
+          </p:cNvSpPr>
+          <p:nvPr>
+            <p:ph type="title"/>
+          </p:nvPr>
+        </p:nvSpPr>
+        <p:spPr/>
+        <p:txBody>
+          <a:bodyPr>
+            <a:normAutofit/>
+          </a:bodyPr>
+          <a:lstStyle/>
+          <a:p>
+            <a:r>
+              <a:rPr lang="en-US" dirty="0" smtClean="0"/>
+              <a:t>Unsupervised </a:t>
+            </a:r>
+            <a:r>
+              <a:rPr lang="en-US" dirty="0" smtClean="0"/>
+              <a:t>Learning – Examples  </a:t>
+            </a:r>
+            <a:endParaRPr lang="en-US" dirty="0"/>
+          </a:p>
+        </p:txBody>
+      </p:sp>
+      <p:sp>
+        <p:nvSpPr>
+          <p:cNvPr id="3" name="Content Placeholder 2"/>
+          <p:cNvSpPr>
+            <a:spLocks noGrp="1"/>
+          </p:cNvSpPr>
+          <p:nvPr>
+            <p:ph idx="1"/>
+          </p:nvPr>
+        </p:nvSpPr>
+        <p:spPr/>
+        <p:txBody>
+          <a:bodyPr>
+            <a:normAutofit/>
+          </a:bodyPr>
+          <a:lstStyle/>
+          <a:p>
+            <a:r>
+              <a:rPr lang="en-IN" dirty="0" smtClean="0"/>
+              <a:t>Feature learning</a:t>
+            </a:r>
+          </a:p>
+          <a:p>
+            <a:r>
+              <a:rPr lang="en-IN" dirty="0" smtClean="0"/>
+              <a:t>Anomaly </a:t>
+            </a:r>
+            <a:r>
+              <a:rPr lang="en-IN" dirty="0" smtClean="0"/>
+              <a:t>detection</a:t>
+            </a:r>
+            <a:endParaRPr lang="en-IN" dirty="0" smtClean="0"/>
+          </a:p>
+          <a:p>
+            <a:pPr lvl="1"/>
+            <a:r>
+              <a:rPr lang="en-IN" dirty="0" smtClean="0"/>
+              <a:t>Use </a:t>
+            </a:r>
+            <a:r>
+              <a:rPr lang="en-IN" dirty="0" smtClean="0"/>
+              <a:t>auto-encoder </a:t>
+            </a:r>
+            <a:r>
+              <a:rPr lang="en-IN" dirty="0" smtClean="0"/>
+              <a:t>for feature learning</a:t>
+            </a:r>
+          </a:p>
+          <a:p>
+            <a:pPr lvl="1"/>
+            <a:r>
+              <a:rPr lang="en-IN" dirty="0" smtClean="0"/>
+              <a:t>Detect anomaly using reconstruction error and threshold</a:t>
+            </a:r>
+            <a:endParaRPr lang="en-US" dirty="0" smtClean="0"/>
+          </a:p>
+        </p:txBody>
+      </p:sp>
+    </p:spTree>
+  </p:cSld>
+  <p:clrMapOvr>
+    <a:masterClrMapping/>
+  </p:clrMapOvr>
+  <p:timing>
+    <p:tnLst>
+      <p:par>
+        <p:cTn id="1" dur="indefinite" restart="never" nodeType="tmRoot"/>
+      </p:par>
+    </p:tnLst>
+  </p:timing>
+</p:sld>
+</file>
+
 <file path=ppt/slides/slide2.xml><?xml version="1.0" encoding="utf-8"?>
 <p:sld xmlns:a="http://schemas.openxmlformats.org/drawingml/2006/main" xmlns:r="http://schemas.openxmlformats.org/officeDocument/2006/relationships" xmlns:p="http://schemas.openxmlformats.org/presentationml/2006/main">
   <p:cSld>
@@ -3559,18 +5022,109 @@
           <a:p>
             <a:r>
               <a:rPr lang="en-US" dirty="0" smtClean="0"/>
-              <a:t>AI Classification</a:t>
+              <a:t>AI </a:t>
+            </a:r>
+            <a:r>
+              <a:rPr lang="en-US" dirty="0" smtClean="0"/>
+              <a:t>Classification</a:t>
+            </a:r>
+          </a:p>
+          <a:p>
+            <a:r>
+              <a:rPr lang="en-US" dirty="0" smtClean="0"/>
+              <a:t>Machine Learning – What </a:t>
+            </a:r>
+            <a:r>
+              <a:rPr lang="en-US" dirty="0" smtClean="0"/>
+              <a:t>?</a:t>
+            </a:r>
+          </a:p>
+          <a:p>
+            <a:r>
+              <a:rPr lang="en-US" dirty="0" smtClean="0"/>
+              <a:t>ML Classification</a:t>
             </a:r>
             <a:endParaRPr lang="en-US" dirty="0" smtClean="0"/>
           </a:p>
           <a:p>
-            <a:r>
-              <a:rPr lang="en-US" dirty="0" smtClean="0"/>
-              <a:t>Conclusions</a:t>
-            </a:r>
-            <a:endParaRPr lang="en-US" dirty="0" smtClean="0"/>
-          </a:p>
-          <a:p>
+            <a:endParaRPr lang="en-US" dirty="0"/>
+          </a:p>
+        </p:txBody>
+      </p:sp>
+    </p:spTree>
+  </p:cSld>
+  <p:clrMapOvr>
+    <a:masterClrMapping/>
+  </p:clrMapOvr>
+  <p:timing>
+    <p:tnLst>
+      <p:par>
+        <p:cTn id="1" dur="indefinite" restart="never" nodeType="tmRoot"/>
+      </p:par>
+    </p:tnLst>
+  </p:timing>
+</p:sld>
+</file>
+
+<file path=ppt/slides/slide20.xml><?xml version="1.0" encoding="utf-8"?>
+<p:sld xmlns:a="http://schemas.openxmlformats.org/drawingml/2006/main" xmlns:r="http://schemas.openxmlformats.org/officeDocument/2006/relationships" xmlns:p="http://schemas.openxmlformats.org/presentationml/2006/main">
+  <p:cSld>
+    <p:spTree>
+      <p:nvGrpSpPr>
+        <p:cNvPr id="1" name=""/>
+        <p:cNvGrpSpPr/>
+        <p:nvPr/>
+      </p:nvGrpSpPr>
+      <p:grpSpPr>
+        <a:xfrm>
+          <a:off x="0" y="0"/>
+          <a:ext cx="0" cy="0"/>
+          <a:chOff x="0" y="0"/>
+          <a:chExt cx="0" cy="0"/>
+        </a:xfrm>
+      </p:grpSpPr>
+      <p:sp>
+        <p:nvSpPr>
+          <p:cNvPr id="2" name="Title 1"/>
+          <p:cNvSpPr>
+            <a:spLocks noGrp="1"/>
+          </p:cNvSpPr>
+          <p:nvPr>
+            <p:ph type="ctrTitle"/>
+          </p:nvPr>
+        </p:nvSpPr>
+        <p:spPr/>
+        <p:txBody>
+          <a:bodyPr/>
+          <a:lstStyle/>
+          <a:p>
+            <a:r>
+              <a:rPr lang="en-US" dirty="0" smtClean="0"/>
+              <a:t>Questions?</a:t>
+            </a:r>
+            <a:endParaRPr lang="en-US" dirty="0"/>
+          </a:p>
+        </p:txBody>
+      </p:sp>
+      <p:sp>
+        <p:nvSpPr>
+          <p:cNvPr id="3" name="Subtitle 2"/>
+          <p:cNvSpPr>
+            <a:spLocks noGrp="1"/>
+          </p:cNvSpPr>
+          <p:nvPr>
+            <p:ph type="subTitle" idx="1"/>
+          </p:nvPr>
+        </p:nvSpPr>
+        <p:spPr/>
+        <p:txBody>
+          <a:bodyPr/>
+          <a:lstStyle/>
+          <a:p>
+            <a:r>
+              <a:rPr lang="en-US" dirty="0" smtClean="0"/>
+              <a:t>Thank you</a:t>
+            </a:r>
             <a:endParaRPr lang="en-US" dirty="0"/>
           </a:p>
         </p:txBody>
@@ -3741,7 +5295,11 @@
           <a:p>
             <a:r>
               <a:rPr lang="en-US" dirty="0" smtClean="0"/>
-              <a:t>AI Classification  </a:t>
+              <a:t>AI </a:t>
+            </a:r>
+            <a:r>
+              <a:rPr lang="en-US" dirty="0" smtClean="0"/>
+              <a:t>Classification (1)  </a:t>
             </a:r>
             <a:endParaRPr lang="en-US" dirty="0"/>
           </a:p>
@@ -3880,17 +5438,19 @@
             <a:spLocks noGrp="1"/>
           </p:cNvSpPr>
           <p:nvPr>
-            <p:ph type="ctrTitle"/>
-          </p:nvPr>
-        </p:nvSpPr>
-        <p:spPr/>
-        <p:txBody>
-          <a:bodyPr/>
-          <a:lstStyle/>
-          <a:p>
-            <a:r>
-              <a:rPr lang="en-US" dirty="0" smtClean="0"/>
-              <a:t>Questions?</a:t>
+            <p:ph type="title"/>
+          </p:nvPr>
+        </p:nvSpPr>
+        <p:spPr/>
+        <p:txBody>
+          <a:bodyPr>
+            <a:normAutofit/>
+          </a:bodyPr>
+          <a:lstStyle/>
+          <a:p>
+            <a:r>
+              <a:rPr lang="en-US" dirty="0" smtClean="0"/>
+              <a:t>Artificial Narrow Intelligence  </a:t>
             </a:r>
             <a:endParaRPr lang="en-US" dirty="0"/>
           </a:p>
@@ -3898,24 +5458,577 @@
       </p:sp>
       <p:sp>
         <p:nvSpPr>
-          <p:cNvPr id="3" name="Subtitle 2"/>
-          <p:cNvSpPr>
-            <a:spLocks noGrp="1"/>
-          </p:cNvSpPr>
-          <p:nvPr>
-            <p:ph type="subTitle" idx="1"/>
-          </p:nvPr>
-        </p:nvSpPr>
-        <p:spPr/>
-        <p:txBody>
-          <a:bodyPr/>
-          <a:lstStyle/>
-          <a:p>
-            <a:r>
-              <a:rPr lang="en-US" dirty="0" smtClean="0"/>
-              <a:t>Thank you</a:t>
+          <p:cNvPr id="3" name="Content Placeholder 2"/>
+          <p:cNvSpPr>
+            <a:spLocks noGrp="1"/>
+          </p:cNvSpPr>
+          <p:nvPr>
+            <p:ph idx="1"/>
+          </p:nvPr>
+        </p:nvSpPr>
+        <p:spPr/>
+        <p:txBody>
+          <a:bodyPr>
+            <a:normAutofit/>
+          </a:bodyPr>
+          <a:lstStyle/>
+          <a:p>
+            <a:r>
+              <a:rPr lang="en-IN" dirty="0" smtClean="0"/>
+              <a:t>Solve one specific problem</a:t>
+            </a:r>
+          </a:p>
+          <a:p>
+            <a:r>
+              <a:rPr lang="en-IN" dirty="0" smtClean="0"/>
+              <a:t>Surpass human level performance</a:t>
+            </a:r>
+          </a:p>
+          <a:p>
+            <a:r>
+              <a:rPr lang="en-IN" dirty="0" smtClean="0"/>
+              <a:t>Narrow capabilities in controlled environments</a:t>
+            </a:r>
+          </a:p>
+          <a:p>
+            <a:r>
+              <a:rPr lang="en-IN" dirty="0" smtClean="0"/>
+              <a:t>Examples – Face recognition, </a:t>
+            </a:r>
+            <a:r>
+              <a:rPr lang="en-IN" dirty="0" smtClean="0"/>
+              <a:t>automatic number plate </a:t>
+            </a:r>
+            <a:r>
+              <a:rPr lang="en-IN" dirty="0" smtClean="0"/>
+              <a:t>recognition</a:t>
+            </a:r>
+            <a:endParaRPr lang="en-US" dirty="0" smtClean="0"/>
+          </a:p>
+        </p:txBody>
+      </p:sp>
+    </p:spTree>
+  </p:cSld>
+  <p:clrMapOvr>
+    <a:masterClrMapping/>
+  </p:clrMapOvr>
+  <p:timing>
+    <p:tnLst>
+      <p:par>
+        <p:cTn id="1" dur="indefinite" restart="never" nodeType="tmRoot"/>
+      </p:par>
+    </p:tnLst>
+  </p:timing>
+</p:sld>
+</file>
+
+<file path=ppt/slides/slide6.xml><?xml version="1.0" encoding="utf-8"?>
+<p:sld xmlns:a="http://schemas.openxmlformats.org/drawingml/2006/main" xmlns:r="http://schemas.openxmlformats.org/officeDocument/2006/relationships" xmlns:p="http://schemas.openxmlformats.org/presentationml/2006/main">
+  <p:cSld>
+    <p:spTree>
+      <p:nvGrpSpPr>
+        <p:cNvPr id="1" name=""/>
+        <p:cNvGrpSpPr/>
+        <p:nvPr/>
+      </p:nvGrpSpPr>
+      <p:grpSpPr>
+        <a:xfrm>
+          <a:off x="0" y="0"/>
+          <a:ext cx="0" cy="0"/>
+          <a:chOff x="0" y="0"/>
+          <a:chExt cx="0" cy="0"/>
+        </a:xfrm>
+      </p:grpSpPr>
+      <p:sp>
+        <p:nvSpPr>
+          <p:cNvPr id="2" name="Title 1"/>
+          <p:cNvSpPr>
+            <a:spLocks noGrp="1"/>
+          </p:cNvSpPr>
+          <p:nvPr>
+            <p:ph type="title"/>
+          </p:nvPr>
+        </p:nvSpPr>
+        <p:spPr/>
+        <p:txBody>
+          <a:bodyPr>
+            <a:normAutofit/>
+          </a:bodyPr>
+          <a:lstStyle/>
+          <a:p>
+            <a:r>
+              <a:rPr lang="en-US" dirty="0" smtClean="0"/>
+              <a:t>Artificial General Intelligence  </a:t>
             </a:r>
             <a:endParaRPr lang="en-US" dirty="0"/>
+          </a:p>
+        </p:txBody>
+      </p:sp>
+      <p:sp>
+        <p:nvSpPr>
+          <p:cNvPr id="3" name="Content Placeholder 2"/>
+          <p:cNvSpPr>
+            <a:spLocks noGrp="1"/>
+          </p:cNvSpPr>
+          <p:nvPr>
+            <p:ph idx="1"/>
+          </p:nvPr>
+        </p:nvSpPr>
+        <p:spPr/>
+        <p:txBody>
+          <a:bodyPr>
+            <a:normAutofit/>
+          </a:bodyPr>
+          <a:lstStyle/>
+          <a:p>
+            <a:r>
+              <a:rPr lang="en-IN" dirty="0" smtClean="0"/>
+              <a:t>Do anything a human can do</a:t>
+            </a:r>
+          </a:p>
+          <a:p>
+            <a:r>
+              <a:rPr lang="en-IN" dirty="0" smtClean="0"/>
+              <a:t>Theoretical concept</a:t>
+            </a:r>
+          </a:p>
+          <a:p>
+            <a:r>
+              <a:rPr lang="en-IN" dirty="0" smtClean="0"/>
+              <a:t>Collection of many Artificial Narrow Intelligence systems</a:t>
+            </a:r>
+            <a:endParaRPr lang="en-US" dirty="0" smtClean="0"/>
+          </a:p>
+        </p:txBody>
+      </p:sp>
+    </p:spTree>
+  </p:cSld>
+  <p:clrMapOvr>
+    <a:masterClrMapping/>
+  </p:clrMapOvr>
+  <p:timing>
+    <p:tnLst>
+      <p:par>
+        <p:cTn id="1" dur="indefinite" restart="never" nodeType="tmRoot"/>
+      </p:par>
+    </p:tnLst>
+  </p:timing>
+</p:sld>
+</file>
+
+<file path=ppt/slides/slide7.xml><?xml version="1.0" encoding="utf-8"?>
+<p:sld xmlns:a="http://schemas.openxmlformats.org/drawingml/2006/main" xmlns:r="http://schemas.openxmlformats.org/officeDocument/2006/relationships" xmlns:p="http://schemas.openxmlformats.org/presentationml/2006/main">
+  <p:cSld>
+    <p:spTree>
+      <p:nvGrpSpPr>
+        <p:cNvPr id="1" name=""/>
+        <p:cNvGrpSpPr/>
+        <p:nvPr/>
+      </p:nvGrpSpPr>
+      <p:grpSpPr>
+        <a:xfrm>
+          <a:off x="0" y="0"/>
+          <a:ext cx="0" cy="0"/>
+          <a:chOff x="0" y="0"/>
+          <a:chExt cx="0" cy="0"/>
+        </a:xfrm>
+      </p:grpSpPr>
+      <p:sp>
+        <p:nvSpPr>
+          <p:cNvPr id="2" name="Title 1"/>
+          <p:cNvSpPr>
+            <a:spLocks noGrp="1"/>
+          </p:cNvSpPr>
+          <p:nvPr>
+            <p:ph type="title"/>
+          </p:nvPr>
+        </p:nvSpPr>
+        <p:spPr/>
+        <p:txBody>
+          <a:bodyPr>
+            <a:normAutofit/>
+          </a:bodyPr>
+          <a:lstStyle/>
+          <a:p>
+            <a:r>
+              <a:rPr lang="en-US" dirty="0" smtClean="0"/>
+              <a:t>Artificial Super Intelligence  </a:t>
+            </a:r>
+            <a:endParaRPr lang="en-US" dirty="0"/>
+          </a:p>
+        </p:txBody>
+      </p:sp>
+      <p:sp>
+        <p:nvSpPr>
+          <p:cNvPr id="3" name="Content Placeholder 2"/>
+          <p:cNvSpPr>
+            <a:spLocks noGrp="1"/>
+          </p:cNvSpPr>
+          <p:nvPr>
+            <p:ph idx="1"/>
+          </p:nvPr>
+        </p:nvSpPr>
+        <p:spPr/>
+        <p:txBody>
+          <a:bodyPr>
+            <a:normAutofit/>
+          </a:bodyPr>
+          <a:lstStyle/>
+          <a:p>
+            <a:r>
+              <a:rPr lang="en-IN" dirty="0" smtClean="0"/>
+              <a:t>Surpass all human capabilities</a:t>
+            </a:r>
+          </a:p>
+          <a:p>
+            <a:r>
+              <a:rPr lang="en-IN" dirty="0" smtClean="0"/>
+              <a:t>Do even more things than any human can do</a:t>
+            </a:r>
+          </a:p>
+          <a:p>
+            <a:r>
+              <a:rPr lang="en-IN" dirty="0" smtClean="0"/>
+              <a:t>Relatively narrow gap between AGI and </a:t>
+            </a:r>
+            <a:r>
+              <a:rPr lang="en-IN" dirty="0" smtClean="0"/>
+              <a:t>ASI</a:t>
+            </a:r>
+          </a:p>
+          <a:p>
+            <a:r>
+              <a:rPr lang="en-IN" dirty="0" smtClean="0"/>
+              <a:t>A nanosecond from AGI to ASI</a:t>
+            </a:r>
+            <a:endParaRPr lang="en-US" dirty="0" smtClean="0"/>
+          </a:p>
+        </p:txBody>
+      </p:sp>
+    </p:spTree>
+  </p:cSld>
+  <p:clrMapOvr>
+    <a:masterClrMapping/>
+  </p:clrMapOvr>
+  <p:timing>
+    <p:tnLst>
+      <p:par>
+        <p:cTn id="1" dur="indefinite" restart="never" nodeType="tmRoot"/>
+      </p:par>
+    </p:tnLst>
+  </p:timing>
+</p:sld>
+</file>
+
+<file path=ppt/slides/slide8.xml><?xml version="1.0" encoding="utf-8"?>
+<p:sld xmlns:a="http://schemas.openxmlformats.org/drawingml/2006/main" xmlns:r="http://schemas.openxmlformats.org/officeDocument/2006/relationships" xmlns:p="http://schemas.openxmlformats.org/presentationml/2006/main">
+  <p:cSld>
+    <p:spTree>
+      <p:nvGrpSpPr>
+        <p:cNvPr id="1" name=""/>
+        <p:cNvGrpSpPr/>
+        <p:nvPr/>
+      </p:nvGrpSpPr>
+      <p:grpSpPr>
+        <a:xfrm>
+          <a:off x="0" y="0"/>
+          <a:ext cx="0" cy="0"/>
+          <a:chOff x="0" y="0"/>
+          <a:chExt cx="0" cy="0"/>
+        </a:xfrm>
+      </p:grpSpPr>
+      <p:sp>
+        <p:nvSpPr>
+          <p:cNvPr id="2" name="Title 1"/>
+          <p:cNvSpPr>
+            <a:spLocks noGrp="1"/>
+          </p:cNvSpPr>
+          <p:nvPr>
+            <p:ph type="title"/>
+          </p:nvPr>
+        </p:nvSpPr>
+        <p:spPr/>
+        <p:txBody>
+          <a:bodyPr>
+            <a:normAutofit/>
+          </a:bodyPr>
+          <a:lstStyle/>
+          <a:p>
+            <a:r>
+              <a:rPr lang="en-US" dirty="0" smtClean="0"/>
+              <a:t>AI </a:t>
+            </a:r>
+            <a:r>
+              <a:rPr lang="en-US" dirty="0" smtClean="0"/>
+              <a:t>Classification (2)  </a:t>
+            </a:r>
+            <a:endParaRPr lang="en-US" dirty="0"/>
+          </a:p>
+        </p:txBody>
+      </p:sp>
+      <p:sp>
+        <p:nvSpPr>
+          <p:cNvPr id="3" name="Content Placeholder 2"/>
+          <p:cNvSpPr>
+            <a:spLocks noGrp="1"/>
+          </p:cNvSpPr>
+          <p:nvPr>
+            <p:ph idx="1"/>
+          </p:nvPr>
+        </p:nvSpPr>
+        <p:spPr/>
+        <p:txBody>
+          <a:bodyPr>
+            <a:normAutofit/>
+          </a:bodyPr>
+          <a:lstStyle/>
+          <a:p>
+            <a:r>
+              <a:rPr lang="en-US" dirty="0" smtClean="0"/>
+              <a:t>Weak </a:t>
+            </a:r>
+            <a:r>
+              <a:rPr lang="en-US" dirty="0" smtClean="0"/>
+              <a:t>AI</a:t>
+            </a:r>
+          </a:p>
+          <a:p>
+            <a:pPr lvl="1"/>
+            <a:r>
+              <a:rPr lang="en-US" dirty="0" smtClean="0"/>
+              <a:t>Artificial Narrow Intelligence</a:t>
+            </a:r>
+          </a:p>
+          <a:p>
+            <a:r>
+              <a:rPr lang="en-US" dirty="0" smtClean="0"/>
+              <a:t>Strong </a:t>
+            </a:r>
+            <a:r>
+              <a:rPr lang="en-US" dirty="0" smtClean="0"/>
+              <a:t>AI</a:t>
+            </a:r>
+          </a:p>
+          <a:p>
+            <a:pPr lvl="1"/>
+            <a:r>
+              <a:rPr lang="en-US" dirty="0" smtClean="0"/>
+              <a:t>Artificial General Intelligence</a:t>
+            </a:r>
+          </a:p>
+          <a:p>
+            <a:pPr lvl="1"/>
+            <a:r>
+              <a:rPr lang="en-US" dirty="0" smtClean="0"/>
+              <a:t>Artificial Super Intelligence</a:t>
+            </a:r>
+            <a:endParaRPr lang="en-US" dirty="0" smtClean="0"/>
+          </a:p>
+        </p:txBody>
+      </p:sp>
+    </p:spTree>
+  </p:cSld>
+  <p:clrMapOvr>
+    <a:masterClrMapping/>
+  </p:clrMapOvr>
+  <p:timing>
+    <p:tnLst>
+      <p:par>
+        <p:cTn id="1" dur="indefinite" restart="never" nodeType="tmRoot"/>
+      </p:par>
+    </p:tnLst>
+  </p:timing>
+</p:sld>
+</file>
+
+<file path=ppt/slides/slide9.xml><?xml version="1.0" encoding="utf-8"?>
+<p:sld xmlns:a="http://schemas.openxmlformats.org/drawingml/2006/main" xmlns:r="http://schemas.openxmlformats.org/officeDocument/2006/relationships" xmlns:p="http://schemas.openxmlformats.org/presentationml/2006/main">
+  <p:cSld>
+    <p:spTree>
+      <p:nvGrpSpPr>
+        <p:cNvPr id="1" name=""/>
+        <p:cNvGrpSpPr/>
+        <p:nvPr/>
+      </p:nvGrpSpPr>
+      <p:grpSpPr>
+        <a:xfrm>
+          <a:off x="0" y="0"/>
+          <a:ext cx="0" cy="0"/>
+          <a:chOff x="0" y="0"/>
+          <a:chExt cx="0" cy="0"/>
+        </a:xfrm>
+      </p:grpSpPr>
+      <p:sp>
+        <p:nvSpPr>
+          <p:cNvPr id="2" name="Title 1"/>
+          <p:cNvSpPr>
+            <a:spLocks noGrp="1"/>
+          </p:cNvSpPr>
+          <p:nvPr>
+            <p:ph type="title"/>
+          </p:nvPr>
+        </p:nvSpPr>
+        <p:spPr/>
+        <p:txBody>
+          <a:bodyPr>
+            <a:normAutofit/>
+          </a:bodyPr>
+          <a:lstStyle/>
+          <a:p>
+            <a:r>
+              <a:rPr lang="en-US" dirty="0" smtClean="0"/>
+              <a:t>Machine </a:t>
+            </a:r>
+            <a:r>
+              <a:rPr lang="en-US" dirty="0" smtClean="0"/>
+              <a:t>Learning </a:t>
+            </a:r>
+            <a:r>
+              <a:rPr lang="en-US" dirty="0" smtClean="0"/>
+              <a:t>– What ?  </a:t>
+            </a:r>
+            <a:endParaRPr lang="en-US" dirty="0"/>
+          </a:p>
+        </p:txBody>
+      </p:sp>
+      <p:sp>
+        <p:nvSpPr>
+          <p:cNvPr id="3" name="Content Placeholder 2"/>
+          <p:cNvSpPr>
+            <a:spLocks noGrp="1"/>
+          </p:cNvSpPr>
+          <p:nvPr>
+            <p:ph idx="1"/>
+          </p:nvPr>
+        </p:nvSpPr>
+        <p:spPr/>
+        <p:txBody>
+          <a:bodyPr>
+            <a:normAutofit/>
+          </a:bodyPr>
+          <a:lstStyle/>
+          <a:p>
+            <a:r>
+              <a:rPr lang="en-IN" dirty="0" smtClean="0"/>
+              <a:t>Improve through experience using data</a:t>
+            </a:r>
+          </a:p>
+          <a:p>
+            <a:r>
+              <a:rPr lang="en-IN" dirty="0" smtClean="0"/>
+              <a:t>A machine is said to learn from </a:t>
+            </a:r>
+            <a:r>
+              <a:rPr lang="en-IN" dirty="0" smtClean="0">
+                <a:solidFill>
+                  <a:srgbClr val="00B050"/>
+                </a:solidFill>
+              </a:rPr>
+              <a:t>experience E</a:t>
+            </a:r>
+            <a:r>
+              <a:rPr lang="en-IN" dirty="0" smtClean="0"/>
+              <a:t> with respect to some class of </a:t>
+            </a:r>
+            <a:r>
+              <a:rPr lang="en-IN" dirty="0" smtClean="0">
+                <a:solidFill>
+                  <a:srgbClr val="00B050"/>
+                </a:solidFill>
+              </a:rPr>
+              <a:t>tasks T</a:t>
+            </a:r>
+            <a:r>
+              <a:rPr lang="en-IN" dirty="0" smtClean="0"/>
+              <a:t> and </a:t>
+            </a:r>
+            <a:r>
+              <a:rPr lang="en-IN" dirty="0" smtClean="0">
+                <a:solidFill>
+                  <a:srgbClr val="00B050"/>
+                </a:solidFill>
+              </a:rPr>
+              <a:t>performance measure </a:t>
+            </a:r>
+            <a:r>
+              <a:rPr lang="en-IN" dirty="0" smtClean="0">
+                <a:solidFill>
+                  <a:srgbClr val="00B050"/>
+                </a:solidFill>
+              </a:rPr>
+              <a:t>P</a:t>
+            </a:r>
+            <a:r>
+              <a:rPr lang="en-IN" dirty="0" smtClean="0"/>
+              <a:t>.</a:t>
+            </a:r>
+            <a:r>
+              <a:rPr lang="en-IN" dirty="0" smtClean="0">
+                <a:solidFill>
+                  <a:srgbClr val="00B050"/>
+                </a:solidFill>
+              </a:rPr>
+              <a:t> </a:t>
+            </a:r>
+          </a:p>
+          <a:p>
+            <a:r>
+              <a:rPr lang="en-IN" dirty="0" smtClean="0"/>
+              <a:t>If </a:t>
+            </a:r>
+            <a:r>
+              <a:rPr lang="en-IN" dirty="0" smtClean="0"/>
+              <a:t>its performance at </a:t>
+            </a:r>
+            <a:r>
+              <a:rPr lang="en-IN" dirty="0" smtClean="0">
+                <a:solidFill>
+                  <a:srgbClr val="00B050"/>
+                </a:solidFill>
+              </a:rPr>
+              <a:t>tasks</a:t>
+            </a:r>
+            <a:r>
+              <a:rPr lang="en-IN" dirty="0" smtClean="0"/>
+              <a:t> in </a:t>
+            </a:r>
+            <a:r>
+              <a:rPr lang="en-IN" dirty="0" smtClean="0">
+                <a:solidFill>
+                  <a:srgbClr val="00B050"/>
+                </a:solidFill>
+              </a:rPr>
+              <a:t>T</a:t>
+            </a:r>
+            <a:r>
+              <a:rPr lang="en-IN" dirty="0" smtClean="0"/>
+              <a:t>, as measured by </a:t>
+            </a:r>
+            <a:r>
+              <a:rPr lang="en-IN" dirty="0" smtClean="0">
+                <a:solidFill>
+                  <a:srgbClr val="00B050"/>
+                </a:solidFill>
+              </a:rPr>
+              <a:t>P</a:t>
+            </a:r>
+            <a:r>
+              <a:rPr lang="en-IN" dirty="0" smtClean="0"/>
+              <a:t>, improves with </a:t>
+            </a:r>
+            <a:r>
+              <a:rPr lang="en-IN" dirty="0" smtClean="0">
+                <a:solidFill>
+                  <a:srgbClr val="00B050"/>
+                </a:solidFill>
+              </a:rPr>
+              <a:t>experience E</a:t>
+            </a:r>
+            <a:r>
+              <a:rPr lang="en-IN" dirty="0" smtClean="0"/>
+              <a:t>.</a:t>
+            </a:r>
+            <a:endParaRPr lang="en-US" dirty="0" smtClean="0"/>
           </a:p>
         </p:txBody>
       </p:sp>

</xml_diff>